<commit_message>
DU übersetzt ins englische, Beispiel vereinfacht
</commit_message>
<xml_diff>
--- a/20151202Extended/FSharp.pptx
+++ b/20151202Extended/FSharp.pptx
@@ -4091,9 +4091,12 @@
             </a:r>
             <a:r>
               <a:rPr lang="de-DE" baseline="0" dirty="0" smtClean="0"/>
-              <a:t>, …</a:t>
-            </a:r>
-            <a:endParaRPr lang="en-US" dirty="0" smtClean="0"/>
+              <a:t>, </a:t>
+            </a:r>
+            <a:r>
+              <a:rPr lang="de-DE" baseline="0" dirty="0" smtClean="0"/>
+              <a:t>…</a:t>
+            </a:r>
           </a:p>
           <a:p>
             <a:pPr marL="0" marR="0" indent="0" algn="l" defTabSz="914400" rtl="0" eaLnBrk="1" fontAlgn="auto" latinLnBrk="0" hangingPunct="1">
@@ -4116,7 +4119,478 @@
             <a:endParaRPr lang="de-DE" baseline="0" dirty="0" smtClean="0"/>
           </a:p>
           <a:p>
-            <a:endParaRPr lang="en-US" dirty="0"/>
+            <a:pPr marL="0" marR="0" indent="0" algn="l" defTabSz="914400" rtl="0" eaLnBrk="1" fontAlgn="auto" latinLnBrk="0" hangingPunct="1">
+              <a:lnSpc>
+                <a:spcPct val="100000"/>
+              </a:lnSpc>
+              <a:spcBef>
+                <a:spcPts val="0"/>
+              </a:spcBef>
+              <a:spcAft>
+                <a:spcPts val="0"/>
+              </a:spcAft>
+              <a:buClrTx/>
+              <a:buSzTx/>
+              <a:buFontTx/>
+              <a:buNone/>
+              <a:tabLst/>
+              <a:defRPr/>
+            </a:pPr>
+            <a:r>
+              <a:rPr lang="de-DE" baseline="0" dirty="0" smtClean="0"/>
+              <a:t>Zwei Arten mit F# zu arbeiten:</a:t>
+            </a:r>
+          </a:p>
+          <a:p>
+            <a:pPr marL="171450" marR="0" indent="-171450" algn="l" defTabSz="914400" rtl="0" eaLnBrk="1" fontAlgn="auto" latinLnBrk="0" hangingPunct="1">
+              <a:lnSpc>
+                <a:spcPct val="100000"/>
+              </a:lnSpc>
+              <a:spcBef>
+                <a:spcPts val="0"/>
+              </a:spcBef>
+              <a:spcAft>
+                <a:spcPts val="0"/>
+              </a:spcAft>
+              <a:buClrTx/>
+              <a:buSzTx/>
+              <a:buFontTx/>
+              <a:buChar char="-"/>
+              <a:tabLst/>
+              <a:defRPr/>
+            </a:pPr>
+            <a:r>
+              <a:rPr lang="de-DE" baseline="0" dirty="0" smtClean="0"/>
+              <a:t>Werkzeugmacherinnen</a:t>
+            </a:r>
+          </a:p>
+          <a:p>
+            <a:pPr marL="171450" marR="0" indent="-171450" algn="l" defTabSz="914400" rtl="0" eaLnBrk="1" fontAlgn="auto" latinLnBrk="0" hangingPunct="1">
+              <a:lnSpc>
+                <a:spcPct val="100000"/>
+              </a:lnSpc>
+              <a:spcBef>
+                <a:spcPts val="0"/>
+              </a:spcBef>
+              <a:spcAft>
+                <a:spcPts val="0"/>
+              </a:spcAft>
+              <a:buClrTx/>
+              <a:buSzTx/>
+              <a:buFontTx/>
+              <a:buChar char="-"/>
+              <a:tabLst/>
+              <a:defRPr/>
+            </a:pPr>
+            <a:r>
+              <a:rPr lang="de-DE" baseline="0" dirty="0" err="1" smtClean="0"/>
+              <a:t>Zeugmacher</a:t>
+            </a:r>
+            <a:endParaRPr lang="de-DE" baseline="0" dirty="0" smtClean="0"/>
+          </a:p>
+          <a:p>
+            <a:pPr marL="171450" marR="0" indent="-171450" algn="l" defTabSz="914400" rtl="0" eaLnBrk="1" fontAlgn="auto" latinLnBrk="0" hangingPunct="1">
+              <a:lnSpc>
+                <a:spcPct val="100000"/>
+              </a:lnSpc>
+              <a:spcBef>
+                <a:spcPts val="0"/>
+              </a:spcBef>
+              <a:spcAft>
+                <a:spcPts val="0"/>
+              </a:spcAft>
+              <a:buClrTx/>
+              <a:buSzTx/>
+              <a:buFontTx/>
+              <a:buChar char="-"/>
+              <a:tabLst/>
+              <a:defRPr/>
+            </a:pPr>
+            <a:endParaRPr lang="de-DE" baseline="0" dirty="0" smtClean="0"/>
+          </a:p>
+          <a:p>
+            <a:pPr marL="0" marR="0" indent="0" algn="l" defTabSz="914400" rtl="0" eaLnBrk="1" fontAlgn="auto" latinLnBrk="0" hangingPunct="1">
+              <a:lnSpc>
+                <a:spcPct val="100000"/>
+              </a:lnSpc>
+              <a:spcBef>
+                <a:spcPts val="0"/>
+              </a:spcBef>
+              <a:spcAft>
+                <a:spcPts val="0"/>
+              </a:spcAft>
+              <a:buClrTx/>
+              <a:buSzTx/>
+              <a:buFontTx/>
+              <a:buNone/>
+              <a:tabLst/>
+              <a:defRPr/>
+            </a:pPr>
+            <a:r>
+              <a:rPr lang="de-DE" baseline="0" dirty="0" err="1" smtClean="0"/>
+              <a:t>Zeugmacherinnen</a:t>
+            </a:r>
+            <a:r>
+              <a:rPr lang="de-DE" baseline="0" dirty="0" smtClean="0"/>
+              <a:t> beschäftigen sich mit den praktischen Aspekten: Wie kann ich F# und das funktionale Paradigma einsetzen:</a:t>
+            </a:r>
+          </a:p>
+          <a:p>
+            <a:pPr marL="171450" marR="0" indent="-171450" algn="l" defTabSz="914400" rtl="0" eaLnBrk="1" fontAlgn="auto" latinLnBrk="0" hangingPunct="1">
+              <a:lnSpc>
+                <a:spcPct val="100000"/>
+              </a:lnSpc>
+              <a:spcBef>
+                <a:spcPts val="0"/>
+              </a:spcBef>
+              <a:spcAft>
+                <a:spcPts val="0"/>
+              </a:spcAft>
+              <a:buClrTx/>
+              <a:buSzTx/>
+              <a:buFontTx/>
+              <a:buChar char="-"/>
+              <a:tabLst/>
+              <a:defRPr/>
+            </a:pPr>
+            <a:r>
+              <a:rPr lang="de-DE" baseline="0" dirty="0" smtClean="0"/>
+              <a:t>IO-Zugriff (DB, Dateisystem, Streams)</a:t>
+            </a:r>
+          </a:p>
+          <a:p>
+            <a:pPr marL="171450" marR="0" indent="-171450" algn="l" defTabSz="914400" rtl="0" eaLnBrk="1" fontAlgn="auto" latinLnBrk="0" hangingPunct="1">
+              <a:lnSpc>
+                <a:spcPct val="100000"/>
+              </a:lnSpc>
+              <a:spcBef>
+                <a:spcPts val="0"/>
+              </a:spcBef>
+              <a:spcAft>
+                <a:spcPts val="0"/>
+              </a:spcAft>
+              <a:buClrTx/>
+              <a:buSzTx/>
+              <a:buFontTx/>
+              <a:buChar char="-"/>
+              <a:tabLst/>
+              <a:defRPr/>
+            </a:pPr>
+            <a:r>
+              <a:rPr lang="de-DE" baseline="0" dirty="0" smtClean="0"/>
+              <a:t>Methoden zur Behandlung von Nebenwirkungen</a:t>
+            </a:r>
+          </a:p>
+          <a:p>
+            <a:pPr marL="171450" marR="0" indent="-171450" algn="l" defTabSz="914400" rtl="0" eaLnBrk="1" fontAlgn="auto" latinLnBrk="0" hangingPunct="1">
+              <a:lnSpc>
+                <a:spcPct val="100000"/>
+              </a:lnSpc>
+              <a:spcBef>
+                <a:spcPts val="0"/>
+              </a:spcBef>
+              <a:spcAft>
+                <a:spcPts val="0"/>
+              </a:spcAft>
+              <a:buClrTx/>
+              <a:buSzTx/>
+              <a:buFontTx/>
+              <a:buChar char="-"/>
+              <a:tabLst/>
+              <a:defRPr/>
+            </a:pPr>
+            <a:r>
+              <a:rPr lang="de-DE" baseline="0" dirty="0" smtClean="0"/>
+              <a:t>Validierung</a:t>
+            </a:r>
+          </a:p>
+          <a:p>
+            <a:pPr marL="171450" marR="0" indent="-171450" algn="l" defTabSz="914400" rtl="0" eaLnBrk="1" fontAlgn="auto" latinLnBrk="0" hangingPunct="1">
+              <a:lnSpc>
+                <a:spcPct val="100000"/>
+              </a:lnSpc>
+              <a:spcBef>
+                <a:spcPts val="0"/>
+              </a:spcBef>
+              <a:spcAft>
+                <a:spcPts val="0"/>
+              </a:spcAft>
+              <a:buClrTx/>
+              <a:buSzTx/>
+              <a:buFontTx/>
+              <a:buChar char="-"/>
+              <a:tabLst/>
+              <a:defRPr/>
+            </a:pPr>
+            <a:r>
+              <a:rPr lang="de-DE" baseline="0" dirty="0" smtClean="0"/>
+              <a:t>Routing </a:t>
+            </a:r>
+          </a:p>
+          <a:p>
+            <a:pPr marL="171450" marR="0" indent="-171450" algn="l" defTabSz="914400" rtl="0" eaLnBrk="1" fontAlgn="auto" latinLnBrk="0" hangingPunct="1">
+              <a:lnSpc>
+                <a:spcPct val="100000"/>
+              </a:lnSpc>
+              <a:spcBef>
+                <a:spcPts val="0"/>
+              </a:spcBef>
+              <a:spcAft>
+                <a:spcPts val="0"/>
+              </a:spcAft>
+              <a:buClrTx/>
+              <a:buSzTx/>
+              <a:buFontTx/>
+              <a:buChar char="-"/>
+              <a:tabLst/>
+              <a:defRPr/>
+            </a:pPr>
+            <a:r>
+              <a:rPr lang="de-DE" baseline="0" dirty="0" smtClean="0"/>
+              <a:t>UI</a:t>
+            </a:r>
+          </a:p>
+          <a:p>
+            <a:pPr marL="171450" marR="0" indent="-171450" algn="l" defTabSz="914400" rtl="0" eaLnBrk="1" fontAlgn="auto" latinLnBrk="0" hangingPunct="1">
+              <a:lnSpc>
+                <a:spcPct val="100000"/>
+              </a:lnSpc>
+              <a:spcBef>
+                <a:spcPts val="0"/>
+              </a:spcBef>
+              <a:spcAft>
+                <a:spcPts val="0"/>
+              </a:spcAft>
+              <a:buClrTx/>
+              <a:buSzTx/>
+              <a:buFontTx/>
+              <a:buChar char="-"/>
+              <a:tabLst/>
+              <a:defRPr/>
+            </a:pPr>
+            <a:endParaRPr lang="de-DE" baseline="0" dirty="0" smtClean="0"/>
+          </a:p>
+          <a:p>
+            <a:pPr marL="0" marR="0" indent="0" algn="l" defTabSz="914400" rtl="0" eaLnBrk="1" fontAlgn="auto" latinLnBrk="0" hangingPunct="1">
+              <a:lnSpc>
+                <a:spcPct val="100000"/>
+              </a:lnSpc>
+              <a:spcBef>
+                <a:spcPts val="0"/>
+              </a:spcBef>
+              <a:spcAft>
+                <a:spcPts val="0"/>
+              </a:spcAft>
+              <a:buClrTx/>
+              <a:buSzTx/>
+              <a:buFontTx/>
+              <a:buNone/>
+              <a:tabLst/>
+              <a:defRPr/>
+            </a:pPr>
+            <a:r>
+              <a:rPr lang="de-DE" baseline="0" dirty="0" smtClean="0"/>
+              <a:t>Werkzeugmacherinnen beschäftigen sich mit Mathe.</a:t>
+            </a:r>
+          </a:p>
+          <a:p>
+            <a:pPr marL="0" marR="0" indent="0" algn="l" defTabSz="914400" rtl="0" eaLnBrk="1" fontAlgn="auto" latinLnBrk="0" hangingPunct="1">
+              <a:lnSpc>
+                <a:spcPct val="100000"/>
+              </a:lnSpc>
+              <a:spcBef>
+                <a:spcPts val="0"/>
+              </a:spcBef>
+              <a:spcAft>
+                <a:spcPts val="0"/>
+              </a:spcAft>
+              <a:buClrTx/>
+              <a:buSzTx/>
+              <a:buFontTx/>
+              <a:buNone/>
+              <a:tabLst/>
+              <a:defRPr/>
+            </a:pPr>
+            <a:endParaRPr lang="de-DE" baseline="0" dirty="0" smtClean="0"/>
+          </a:p>
+          <a:p>
+            <a:pPr marL="0" marR="0" indent="0" algn="l" defTabSz="914400" rtl="0" eaLnBrk="1" fontAlgn="auto" latinLnBrk="0" hangingPunct="1">
+              <a:lnSpc>
+                <a:spcPct val="100000"/>
+              </a:lnSpc>
+              <a:spcBef>
+                <a:spcPts val="0"/>
+              </a:spcBef>
+              <a:spcAft>
+                <a:spcPts val="0"/>
+              </a:spcAft>
+              <a:buClrTx/>
+              <a:buSzTx/>
+              <a:buFontTx/>
+              <a:buNone/>
+              <a:tabLst/>
+              <a:defRPr/>
+            </a:pPr>
+            <a:r>
+              <a:rPr lang="de-DE" baseline="0" dirty="0" smtClean="0"/>
+              <a:t>OK sehr grob ausgedrückt.</a:t>
+            </a:r>
+          </a:p>
+          <a:p>
+            <a:pPr marL="0" marR="0" indent="0" algn="l" defTabSz="914400" rtl="0" eaLnBrk="1" fontAlgn="auto" latinLnBrk="0" hangingPunct="1">
+              <a:lnSpc>
+                <a:spcPct val="100000"/>
+              </a:lnSpc>
+              <a:spcBef>
+                <a:spcPts val="0"/>
+              </a:spcBef>
+              <a:spcAft>
+                <a:spcPts val="0"/>
+              </a:spcAft>
+              <a:buClrTx/>
+              <a:buSzTx/>
+              <a:buFontTx/>
+              <a:buNone/>
+              <a:tabLst/>
+              <a:defRPr/>
+            </a:pPr>
+            <a:endParaRPr lang="de-DE" baseline="0" dirty="0" smtClean="0"/>
+          </a:p>
+          <a:p>
+            <a:pPr marL="0" marR="0" indent="0" algn="l" defTabSz="914400" rtl="0" eaLnBrk="1" fontAlgn="auto" latinLnBrk="0" hangingPunct="1">
+              <a:lnSpc>
+                <a:spcPct val="100000"/>
+              </a:lnSpc>
+              <a:spcBef>
+                <a:spcPts val="0"/>
+              </a:spcBef>
+              <a:spcAft>
+                <a:spcPts val="0"/>
+              </a:spcAft>
+              <a:buClrTx/>
+              <a:buSzTx/>
+              <a:buFontTx/>
+              <a:buNone/>
+              <a:tabLst/>
+              <a:defRPr/>
+            </a:pPr>
+            <a:r>
+              <a:rPr lang="de-DE" baseline="0" dirty="0" err="1" smtClean="0"/>
+              <a:t>Zeugmacherinnen</a:t>
+            </a:r>
+            <a:r>
+              <a:rPr lang="de-DE" baseline="0" dirty="0" smtClean="0"/>
+              <a:t> werden durch die Arbeit sich sukzessive mit den höheren Konzepte der Programmierung befassen.  Dank Seiten wie </a:t>
+            </a:r>
+            <a:r>
+              <a:rPr lang="de-DE" baseline="0" dirty="0" err="1" smtClean="0"/>
+              <a:t>fsharpforfunandprofit</a:t>
+            </a:r>
+            <a:r>
+              <a:rPr lang="de-DE" baseline="0" dirty="0" smtClean="0"/>
+              <a:t>, könnte </a:t>
+            </a:r>
+            <a:r>
+              <a:rPr lang="de-DE" baseline="0" dirty="0" err="1" smtClean="0"/>
+              <a:t>Monoid</a:t>
+            </a:r>
+            <a:r>
+              <a:rPr lang="de-DE" baseline="0" dirty="0" smtClean="0"/>
+              <a:t> </a:t>
+            </a:r>
+            <a:r>
+              <a:rPr lang="de-DE" baseline="0" dirty="0" err="1" smtClean="0"/>
+              <a:t>Catamorphism</a:t>
+            </a:r>
+            <a:r>
+              <a:rPr lang="de-DE" baseline="0" dirty="0" smtClean="0"/>
+              <a:t> bald ein geläufiger Begriff werden. Kein </a:t>
+            </a:r>
+            <a:r>
+              <a:rPr lang="de-DE" baseline="0" smtClean="0"/>
+              <a:t>Scherz. </a:t>
+            </a:r>
+            <a:endParaRPr lang="de-DE" baseline="0" dirty="0" smtClean="0"/>
+          </a:p>
+          <a:p>
+            <a:pPr marL="0" marR="0" indent="0" algn="l" defTabSz="914400" rtl="0" eaLnBrk="1" fontAlgn="auto" latinLnBrk="0" hangingPunct="1">
+              <a:lnSpc>
+                <a:spcPct val="100000"/>
+              </a:lnSpc>
+              <a:spcBef>
+                <a:spcPts val="0"/>
+              </a:spcBef>
+              <a:spcAft>
+                <a:spcPts val="0"/>
+              </a:spcAft>
+              <a:buClrTx/>
+              <a:buSzTx/>
+              <a:buFontTx/>
+              <a:buNone/>
+              <a:tabLst/>
+              <a:defRPr/>
+            </a:pPr>
+            <a:endParaRPr lang="de-DE" baseline="0" dirty="0" smtClean="0"/>
+          </a:p>
+          <a:p>
+            <a:pPr marL="0" marR="0" indent="0" algn="l" defTabSz="914400" rtl="0" eaLnBrk="1" fontAlgn="auto" latinLnBrk="0" hangingPunct="1">
+              <a:lnSpc>
+                <a:spcPct val="100000"/>
+              </a:lnSpc>
+              <a:spcBef>
+                <a:spcPts val="0"/>
+              </a:spcBef>
+              <a:spcAft>
+                <a:spcPts val="0"/>
+              </a:spcAft>
+              <a:buClrTx/>
+              <a:buSzTx/>
+              <a:buFontTx/>
+              <a:buNone/>
+              <a:tabLst/>
+              <a:defRPr/>
+            </a:pPr>
+            <a:endParaRPr lang="de-DE" baseline="0" dirty="0" smtClean="0"/>
+          </a:p>
+          <a:p>
+            <a:pPr marL="0" marR="0" indent="0" algn="l" defTabSz="914400" rtl="0" eaLnBrk="1" fontAlgn="auto" latinLnBrk="0" hangingPunct="1">
+              <a:lnSpc>
+                <a:spcPct val="100000"/>
+              </a:lnSpc>
+              <a:spcBef>
+                <a:spcPts val="0"/>
+              </a:spcBef>
+              <a:spcAft>
+                <a:spcPts val="0"/>
+              </a:spcAft>
+              <a:buClrTx/>
+              <a:buSzTx/>
+              <a:buFontTx/>
+              <a:buNone/>
+              <a:tabLst/>
+              <a:defRPr/>
+            </a:pPr>
+            <a:endParaRPr lang="de-DE" baseline="0" dirty="0" smtClean="0"/>
+          </a:p>
+          <a:p>
+            <a:pPr marL="0" marR="0" indent="0" algn="l" defTabSz="914400" rtl="0" eaLnBrk="1" fontAlgn="auto" latinLnBrk="0" hangingPunct="1">
+              <a:lnSpc>
+                <a:spcPct val="100000"/>
+              </a:lnSpc>
+              <a:spcBef>
+                <a:spcPts val="0"/>
+              </a:spcBef>
+              <a:spcAft>
+                <a:spcPts val="0"/>
+              </a:spcAft>
+              <a:buClrTx/>
+              <a:buSzTx/>
+              <a:buFontTx/>
+              <a:buNone/>
+              <a:tabLst/>
+              <a:defRPr/>
+            </a:pPr>
+            <a:endParaRPr lang="de-DE" baseline="0" dirty="0" smtClean="0"/>
           </a:p>
         </p:txBody>
       </p:sp>
@@ -7452,15 +7926,15 @@
             </a:pPr>
             <a:r>
               <a:rPr lang="de-DE" dirty="0" smtClean="0"/>
-              <a:t>Typsystem das </a:t>
+              <a:t>Typsystem </a:t>
+            </a:r>
+            <a:r>
+              <a:rPr lang="de-DE" dirty="0" smtClean="0"/>
+              <a:t>begünstigt </a:t>
             </a:r>
             <a:r>
               <a:rPr lang="de-DE" dirty="0"/>
-              <a:t>Komposition </a:t>
-            </a:r>
-            <a:r>
-              <a:rPr lang="de-DE" dirty="0" smtClean="0"/>
-              <a:t>bevorzugt</a:t>
+              <a:t>Komposition</a:t>
             </a:r>
             <a:endParaRPr lang="de-DE" dirty="0"/>
           </a:p>
@@ -7495,9 +7969,34 @@
               <a:t>Func</a:t>
             </a:r>
             <a:r>
-              <a:rPr lang="de-DE" dirty="0"/>
-              <a:t>&lt;&gt;</a:t>
-            </a:r>
+              <a:rPr lang="de-DE" dirty="0" smtClean="0"/>
+              <a:t>&lt;&gt; Syntax durch „</a:t>
+            </a:r>
+            <a:r>
+              <a:rPr lang="en-US" smtClean="0"/>
+              <a:t>let </a:t>
+            </a:r>
+            <a:r>
+              <a:rPr lang="en-US"/>
+              <a:t>f x </a:t>
+            </a:r>
+            <a:r>
+              <a:rPr lang="en-US"/>
+              <a:t>= </a:t>
+            </a:r>
+            <a:r>
+              <a:rPr lang="en-US" smtClean="0"/>
+              <a:t>x”</a:t>
+            </a:r>
+            <a:r>
+              <a:rPr lang="de-DE" smtClean="0"/>
+              <a:t> </a:t>
+            </a:r>
+            <a:r>
+              <a:rPr lang="de-DE" dirty="0" smtClean="0"/>
+              <a:t>ersetzt</a:t>
+            </a:r>
+            <a:endParaRPr lang="de-DE" dirty="0"/>
           </a:p>
           <a:p>
             <a:pPr marL="0" indent="0">

</xml_diff>